<commit_message>
fixed grammer and spelling
</commit_message>
<xml_diff>
--- a/Documents/FINAL Emergency Class Manager FINAL Poster.pptx
+++ b/Documents/FINAL Emergency Class Manager FINAL Poster.pptx
@@ -206,7 +206,7 @@
           <a:p>
             <a:fld id="{64ED9595-0AE4-4B15-B393-D0F1DD0EB94B}" type="datetimeFigureOut">
               <a:rPr lang="en-US" smtClean="0"/>
-              <a:t>12/3/2023</a:t>
+              <a:t>12/4/2023</a:t>
             </a:fld>
             <a:endParaRPr lang="en-US"/>
           </a:p>
@@ -691,7 +691,7 @@
           <a:p>
             <a:fld id="{41C03D7F-B796-4B92-B0C7-6D4C9CC8C787}" type="datetimeFigureOut">
               <a:rPr lang="en-US" smtClean="0"/>
-              <a:t>12/3/2023</a:t>
+              <a:t>12/4/2023</a:t>
             </a:fld>
             <a:endParaRPr lang="en-US"/>
           </a:p>
@@ -859,7 +859,7 @@
           <a:p>
             <a:fld id="{41C03D7F-B796-4B92-B0C7-6D4C9CC8C787}" type="datetimeFigureOut">
               <a:rPr lang="en-US" smtClean="0"/>
-              <a:t>12/3/2023</a:t>
+              <a:t>12/4/2023</a:t>
             </a:fld>
             <a:endParaRPr lang="en-US"/>
           </a:p>
@@ -1037,7 +1037,7 @@
           <a:p>
             <a:fld id="{41C03D7F-B796-4B92-B0C7-6D4C9CC8C787}" type="datetimeFigureOut">
               <a:rPr lang="en-US" smtClean="0"/>
-              <a:t>12/3/2023</a:t>
+              <a:t>12/4/2023</a:t>
             </a:fld>
             <a:endParaRPr lang="en-US"/>
           </a:p>
@@ -1205,7 +1205,7 @@
           <a:p>
             <a:fld id="{41C03D7F-B796-4B92-B0C7-6D4C9CC8C787}" type="datetimeFigureOut">
               <a:rPr lang="en-US" smtClean="0"/>
-              <a:t>12/3/2023</a:t>
+              <a:t>12/4/2023</a:t>
             </a:fld>
             <a:endParaRPr lang="en-US"/>
           </a:p>
@@ -1448,7 +1448,7 @@
           <a:p>
             <a:fld id="{41C03D7F-B796-4B92-B0C7-6D4C9CC8C787}" type="datetimeFigureOut">
               <a:rPr lang="en-US" smtClean="0"/>
-              <a:t>12/3/2023</a:t>
+              <a:t>12/4/2023</a:t>
             </a:fld>
             <a:endParaRPr lang="en-US"/>
           </a:p>
@@ -1677,7 +1677,7 @@
           <a:p>
             <a:fld id="{41C03D7F-B796-4B92-B0C7-6D4C9CC8C787}" type="datetimeFigureOut">
               <a:rPr lang="en-US" smtClean="0"/>
-              <a:t>12/3/2023</a:t>
+              <a:t>12/4/2023</a:t>
             </a:fld>
             <a:endParaRPr lang="en-US"/>
           </a:p>
@@ -2041,7 +2041,7 @@
           <a:p>
             <a:fld id="{41C03D7F-B796-4B92-B0C7-6D4C9CC8C787}" type="datetimeFigureOut">
               <a:rPr lang="en-US" smtClean="0"/>
-              <a:t>12/3/2023</a:t>
+              <a:t>12/4/2023</a:t>
             </a:fld>
             <a:endParaRPr lang="en-US"/>
           </a:p>
@@ -2158,7 +2158,7 @@
           <a:p>
             <a:fld id="{41C03D7F-B796-4B92-B0C7-6D4C9CC8C787}" type="datetimeFigureOut">
               <a:rPr lang="en-US" smtClean="0"/>
-              <a:t>12/3/2023</a:t>
+              <a:t>12/4/2023</a:t>
             </a:fld>
             <a:endParaRPr lang="en-US"/>
           </a:p>
@@ -2253,7 +2253,7 @@
           <a:p>
             <a:fld id="{41C03D7F-B796-4B92-B0C7-6D4C9CC8C787}" type="datetimeFigureOut">
               <a:rPr lang="en-US" smtClean="0"/>
-              <a:t>12/3/2023</a:t>
+              <a:t>12/4/2023</a:t>
             </a:fld>
             <a:endParaRPr lang="en-US"/>
           </a:p>
@@ -2528,7 +2528,7 @@
           <a:p>
             <a:fld id="{41C03D7F-B796-4B92-B0C7-6D4C9CC8C787}" type="datetimeFigureOut">
               <a:rPr lang="en-US" smtClean="0"/>
-              <a:t>12/3/2023</a:t>
+              <a:t>12/4/2023</a:t>
             </a:fld>
             <a:endParaRPr lang="en-US"/>
           </a:p>
@@ -2783,7 +2783,7 @@
           <a:p>
             <a:fld id="{41C03D7F-B796-4B92-B0C7-6D4C9CC8C787}" type="datetimeFigureOut">
               <a:rPr lang="en-US" smtClean="0"/>
-              <a:t>12/3/2023</a:t>
+              <a:t>12/4/2023</a:t>
             </a:fld>
             <a:endParaRPr lang="en-US"/>
           </a:p>
@@ -2994,7 +2994,7 @@
           <a:p>
             <a:fld id="{41C03D7F-B796-4B92-B0C7-6D4C9CC8C787}" type="datetimeFigureOut">
               <a:rPr lang="en-US" smtClean="0"/>
-              <a:t>12/3/2023</a:t>
+              <a:t>12/4/2023</a:t>
             </a:fld>
             <a:endParaRPr lang="en-US"/>
           </a:p>
@@ -3680,7 +3680,7 @@
           <p:nvPr/>
         </p:nvPicPr>
         <p:blipFill>
-          <a:blip r:embed="rId3">
+          <a:blip r:embed="rId3" cstate="print">
             <a:extLst>
               <a:ext uri="{28A0092B-C50C-407E-A947-70E740481C1C}">
                 <a14:useLocalDpi xmlns:a14="http://schemas.microsoft.com/office/drawing/2010/main" val="0"/>
@@ -3744,7 +3744,7 @@
           <a:p>
             <a:pPr algn="just"/>
             <a:r>
-              <a:rPr lang="en-US" sz="3200">
+              <a:rPr lang="en-US" sz="3200" dirty="0">
                 <a:ea typeface="Calibri"/>
                 <a:cs typeface="Calibri"/>
               </a:rPr>
@@ -3754,7 +3754,7 @@
           <a:p>
             <a:pPr algn="just"/>
             <a:r>
-              <a:rPr lang="en-US" sz="3200">
+              <a:rPr lang="en-US" sz="3200" dirty="0">
                 <a:ea typeface="Calibri"/>
                 <a:cs typeface="Calibri"/>
               </a:rPr>
@@ -4451,12 +4451,12 @@
           <a:p>
             <a:pPr algn="ctr"/>
             <a:r>
-              <a:rPr lang="en-US" sz="4800" b="1">
+              <a:rPr lang="en-US" sz="4800" b="1" dirty="0">
                 <a:solidFill>
                   <a:srgbClr val="BB1C3F"/>
                 </a:solidFill>
               </a:rPr>
-              <a:t>Background/Purpose</a:t>
+              <a:t>Background</a:t>
             </a:r>
           </a:p>
         </p:txBody>
@@ -4754,53 +4754,67 @@
           <a:p>
             <a:pPr algn="just"/>
             <a:r>
-              <a:rPr lang="en-US" sz="3200" err="1">
+              <a:rPr lang="en-US" sz="3200" dirty="0" err="1">
                 <a:ea typeface="+mn-lt"/>
                 <a:cs typeface="+mn-lt"/>
               </a:rPr>
               <a:t>Supabase</a:t>
             </a:r>
             <a:r>
-              <a:rPr lang="en-US" sz="3200">
+              <a:rPr lang="en-US" sz="3200" dirty="0">
                 <a:ea typeface="+mn-lt"/>
                 <a:cs typeface="+mn-lt"/>
               </a:rPr>
-              <a:t> is the core database used for the Emergency Class Manager. Supabase is an open-source substitute for Firebase that uses a full Postgres database, has built in sign-ups and logins. It also secures any data with row level security.</a:t>
-            </a:r>
-            <a:endParaRPr lang="en-US"/>
+              <a:t> is the core database used for the Emergency Class Manager. </a:t>
+            </a:r>
+            <a:r>
+              <a:rPr lang="en-US" sz="3200" dirty="0" err="1">
+                <a:ea typeface="+mn-lt"/>
+                <a:cs typeface="+mn-lt"/>
+              </a:rPr>
+              <a:t>Supabase</a:t>
+            </a:r>
+            <a:r>
+              <a:rPr lang="en-US" sz="3200" dirty="0">
+                <a:ea typeface="+mn-lt"/>
+                <a:cs typeface="+mn-lt"/>
+              </a:rPr>
+              <a:t> is an open-source substitute for Firebase that uses a full Postgres database, has built in authentication. It also secures any data with row level security.</a:t>
+            </a:r>
+            <a:endParaRPr lang="en-US" dirty="0"/>
           </a:p>
           <a:p>
             <a:pPr algn="just"/>
             <a:r>
-              <a:rPr lang="en-US" sz="3200">
+              <a:rPr lang="en-US" sz="3200" dirty="0">
                 <a:ea typeface="+mn-lt"/>
                 <a:cs typeface="+mn-lt"/>
               </a:rPr>
               <a:t>Vue3 is a versatile JavaScript framework for building web user interfaces. It is approachable, meaning that it is easy to adjust to meet the website’s needs. Vue3 builds on standard HTML and CSS with intuitive API.</a:t>
             </a:r>
-            <a:endParaRPr lang="en-US"/>
+            <a:endParaRPr lang="en-US" dirty="0"/>
           </a:p>
           <a:p>
             <a:pPr algn="just"/>
             <a:r>
-              <a:rPr lang="en-US" sz="3200" err="1">
+              <a:rPr lang="en-US" sz="3200" dirty="0" err="1">
                 <a:ea typeface="+mn-lt"/>
                 <a:cs typeface="+mn-lt"/>
               </a:rPr>
               <a:t>Vuetify</a:t>
             </a:r>
             <a:r>
-              <a:rPr lang="en-US" sz="3200">
+              <a:rPr lang="en-US" sz="3200" dirty="0">
                 <a:ea typeface="+mn-lt"/>
                 <a:cs typeface="+mn-lt"/>
               </a:rPr>
               <a:t> builds up from Vue3 and adds more components which help with website design.</a:t>
             </a:r>
-            <a:endParaRPr lang="en-US"/>
+            <a:endParaRPr lang="en-US" dirty="0"/>
           </a:p>
           <a:p>
             <a:pPr algn="just"/>
-            <a:endParaRPr lang="en-US" sz="3200">
+            <a:endParaRPr lang="en-US" sz="3200" dirty="0">
               <a:cs typeface="Calibri"/>
             </a:endParaRPr>
           </a:p>
@@ -5225,7 +5239,7 @@
           <a:lstStyle/>
           <a:p>
             <a:r>
-              <a:rPr lang="en-US" sz="3200" b="1">
+              <a:rPr lang="en-US" sz="3200" b="1" dirty="0">
                 <a:solidFill>
                   <a:srgbClr val="BB1C3F"/>
                 </a:solidFill>
@@ -5235,13 +5249,13 @@
               <a:t>Figure 5: </a:t>
             </a:r>
             <a:r>
-              <a:rPr lang="en-US" sz="3200" b="1">
+              <a:rPr lang="en-US" sz="3200" b="1" dirty="0">
                 <a:ea typeface="+mn-lt"/>
                 <a:cs typeface="+mn-lt"/>
               </a:rPr>
-              <a:t>Tables used in Emergency Class Manager</a:t>
-            </a:r>
-            <a:endParaRPr lang="en-US" sz="3200">
+              <a:t>Event Calendar with one event shown</a:t>
+            </a:r>
+            <a:endParaRPr lang="en-US" sz="3200" dirty="0">
               <a:cs typeface="Calibri"/>
             </a:endParaRPr>
           </a:p>

</xml_diff>